<commit_message>
Added new data and precipitation
</commit_message>
<xml_diff>
--- a/Figures/Figure Log.pptx
+++ b/Figures/Figure Log.pptx
@@ -31,6 +31,7 @@
     <p:sldId id="283" r:id="rId25"/>
     <p:sldId id="280" r:id="rId26"/>
     <p:sldId id="281" r:id="rId27"/>
+    <p:sldId id="285" r:id="rId28"/>
   </p:sldIdLst>
   <p:sldSz cx="12192000" cy="6858000"/>
   <p:notesSz cx="6858000" cy="9144000"/>
@@ -4692,7 +4693,7 @@
           <a:p>
             <a:fld id="{E13F3F2A-D55A-4616-9766-A8DD61F0FA8A}" type="datetimeFigureOut">
               <a:rPr lang="en-US" smtClean="0"/>
-              <a:t>3/21/2023</a:t>
+              <a:t>3/23/2023</a:t>
             </a:fld>
             <a:endParaRPr lang="en-US"/>
           </a:p>
@@ -4890,7 +4891,7 @@
           <a:p>
             <a:fld id="{E13F3F2A-D55A-4616-9766-A8DD61F0FA8A}" type="datetimeFigureOut">
               <a:rPr lang="en-US" smtClean="0"/>
-              <a:t>3/21/2023</a:t>
+              <a:t>3/23/2023</a:t>
             </a:fld>
             <a:endParaRPr lang="en-US"/>
           </a:p>
@@ -5098,7 +5099,7 @@
           <a:p>
             <a:fld id="{E13F3F2A-D55A-4616-9766-A8DD61F0FA8A}" type="datetimeFigureOut">
               <a:rPr lang="en-US" smtClean="0"/>
-              <a:t>3/21/2023</a:t>
+              <a:t>3/23/2023</a:t>
             </a:fld>
             <a:endParaRPr lang="en-US"/>
           </a:p>
@@ -5296,7 +5297,7 @@
           <a:p>
             <a:fld id="{E13F3F2A-D55A-4616-9766-A8DD61F0FA8A}" type="datetimeFigureOut">
               <a:rPr lang="en-US" smtClean="0"/>
-              <a:t>3/21/2023</a:t>
+              <a:t>3/23/2023</a:t>
             </a:fld>
             <a:endParaRPr lang="en-US"/>
           </a:p>
@@ -5571,7 +5572,7 @@
           <a:p>
             <a:fld id="{E13F3F2A-D55A-4616-9766-A8DD61F0FA8A}" type="datetimeFigureOut">
               <a:rPr lang="en-US" smtClean="0"/>
-              <a:t>3/21/2023</a:t>
+              <a:t>3/23/2023</a:t>
             </a:fld>
             <a:endParaRPr lang="en-US"/>
           </a:p>
@@ -5836,7 +5837,7 @@
           <a:p>
             <a:fld id="{E13F3F2A-D55A-4616-9766-A8DD61F0FA8A}" type="datetimeFigureOut">
               <a:rPr lang="en-US" smtClean="0"/>
-              <a:t>3/21/2023</a:t>
+              <a:t>3/23/2023</a:t>
             </a:fld>
             <a:endParaRPr lang="en-US"/>
           </a:p>
@@ -6248,7 +6249,7 @@
           <a:p>
             <a:fld id="{E13F3F2A-D55A-4616-9766-A8DD61F0FA8A}" type="datetimeFigureOut">
               <a:rPr lang="en-US" smtClean="0"/>
-              <a:t>3/21/2023</a:t>
+              <a:t>3/23/2023</a:t>
             </a:fld>
             <a:endParaRPr lang="en-US"/>
           </a:p>
@@ -6389,7 +6390,7 @@
           <a:p>
             <a:fld id="{E13F3F2A-D55A-4616-9766-A8DD61F0FA8A}" type="datetimeFigureOut">
               <a:rPr lang="en-US" smtClean="0"/>
-              <a:t>3/21/2023</a:t>
+              <a:t>3/23/2023</a:t>
             </a:fld>
             <a:endParaRPr lang="en-US"/>
           </a:p>
@@ -6502,7 +6503,7 @@
           <a:p>
             <a:fld id="{E13F3F2A-D55A-4616-9766-A8DD61F0FA8A}" type="datetimeFigureOut">
               <a:rPr lang="en-US" smtClean="0"/>
-              <a:t>3/21/2023</a:t>
+              <a:t>3/23/2023</a:t>
             </a:fld>
             <a:endParaRPr lang="en-US"/>
           </a:p>
@@ -6813,7 +6814,7 @@
           <a:p>
             <a:fld id="{E13F3F2A-D55A-4616-9766-A8DD61F0FA8A}" type="datetimeFigureOut">
               <a:rPr lang="en-US" smtClean="0"/>
-              <a:t>3/21/2023</a:t>
+              <a:t>3/23/2023</a:t>
             </a:fld>
             <a:endParaRPr lang="en-US"/>
           </a:p>
@@ -7101,7 +7102,7 @@
           <a:p>
             <a:fld id="{E13F3F2A-D55A-4616-9766-A8DD61F0FA8A}" type="datetimeFigureOut">
               <a:rPr lang="en-US" smtClean="0"/>
-              <a:t>3/21/2023</a:t>
+              <a:t>3/23/2023</a:t>
             </a:fld>
             <a:endParaRPr lang="en-US"/>
           </a:p>
@@ -7342,7 +7343,7 @@
           <a:p>
             <a:fld id="{E13F3F2A-D55A-4616-9766-A8DD61F0FA8A}" type="datetimeFigureOut">
               <a:rPr lang="en-US" smtClean="0"/>
-              <a:t>3/21/2023</a:t>
+              <a:t>3/23/2023</a:t>
             </a:fld>
             <a:endParaRPr lang="en-US"/>
           </a:p>
@@ -15606,6 +15607,66 @@
 </p:sld>
 </file>
 
+<file path=ppt/slides/slide27.xml><?xml version="1.0" encoding="utf-8"?>
+<p:sld xmlns:a="http://schemas.openxmlformats.org/drawingml/2006/main" xmlns:r="http://schemas.openxmlformats.org/officeDocument/2006/relationships" xmlns:p="http://schemas.openxmlformats.org/presentationml/2006/main">
+  <p:cSld>
+    <p:spTree>
+      <p:nvGrpSpPr>
+        <p:cNvPr id="1" name=""/>
+        <p:cNvGrpSpPr/>
+        <p:nvPr/>
+      </p:nvGrpSpPr>
+      <p:grpSpPr>
+        <a:xfrm>
+          <a:off x="0" y="0"/>
+          <a:ext cx="0" cy="0"/>
+          <a:chOff x="0" y="0"/>
+          <a:chExt cx="0" cy="0"/>
+        </a:xfrm>
+      </p:grpSpPr>
+      <p:pic>
+        <p:nvPicPr>
+          <p:cNvPr id="3" name="Picture 2">
+            <a:extLst>
+              <a:ext uri="{FF2B5EF4-FFF2-40B4-BE49-F238E27FC236}">
+                <a16:creationId xmlns:a16="http://schemas.microsoft.com/office/drawing/2014/main" id="{61857965-A62C-C474-00CA-05E5DCC68085}"/>
+              </a:ext>
+            </a:extLst>
+          </p:cNvPr>
+          <p:cNvPicPr>
+            <a:picLocks noChangeAspect="1"/>
+          </p:cNvPicPr>
+          <p:nvPr/>
+        </p:nvPicPr>
+        <p:blipFill>
+          <a:blip r:embed="rId2"/>
+          <a:stretch>
+            <a:fillRect/>
+          </a:stretch>
+        </p:blipFill>
+        <p:spPr>
+          <a:xfrm>
+            <a:off x="3424237" y="42862"/>
+            <a:ext cx="5343525" cy="6772275"/>
+          </a:xfrm>
+          <a:prstGeom prst="rect">
+            <a:avLst/>
+          </a:prstGeom>
+        </p:spPr>
+      </p:pic>
+    </p:spTree>
+    <p:extLst>
+      <p:ext uri="{BB962C8B-B14F-4D97-AF65-F5344CB8AC3E}">
+        <p14:creationId xmlns:p14="http://schemas.microsoft.com/office/powerpoint/2010/main" val="1446930707"/>
+      </p:ext>
+    </p:extLst>
+  </p:cSld>
+  <p:clrMapOvr>
+    <a:masterClrMapping/>
+  </p:clrMapOvr>
+</p:sld>
+</file>
+
 <file path=ppt/slides/slide3.xml><?xml version="1.0" encoding="utf-8"?>
 <p:sld xmlns:a="http://schemas.openxmlformats.org/drawingml/2006/main" xmlns:r="http://schemas.openxmlformats.org/officeDocument/2006/relationships" xmlns:p="http://schemas.openxmlformats.org/presentationml/2006/main">
   <p:cSld>

</xml_diff>